<commit_message>
extended example improved docu
</commit_message>
<xml_diff>
--- a/pptx_tools/resources/example-template.pptx
+++ b/pptx_tools/resources/example-template.pptx
@@ -15,14 +15,14 @@
   <p:notesSz cx="9928225" cy="6797675"/>
   <p:embeddedFontLst>
     <p:embeddedFont>
-      <p:font typeface="Roboto" panose="020B0604020202020204" charset="0"/>
+      <p:font typeface="Calibri" panose="020F0502020204030204" pitchFamily="34" charset="0"/>
       <p:regular r:id="rId5"/>
       <p:bold r:id="rId6"/>
       <p:italic r:id="rId7"/>
       <p:boldItalic r:id="rId8"/>
     </p:embeddedFont>
     <p:embeddedFont>
-      <p:font typeface="Calibri" panose="020F0502020204030204" pitchFamily="34" charset="0"/>
+      <p:font typeface="Roboto" panose="020B0604020202020204" charset="0"/>
       <p:regular r:id="rId9"/>
       <p:bold r:id="rId10"/>
       <p:italic r:id="rId11"/>
@@ -258,7 +258,7 @@
           <a:p>
             <a:fld id="{283A9E21-4981-413F-9BAB-A1BE42E0A624}" type="datetimeFigureOut">
               <a:rPr lang="de-DE" smtClean="0"/>
-              <a:t>19.12.2019</a:t>
+              <a:t>19.01.2020</a:t>
             </a:fld>
             <a:endParaRPr lang="de-DE"/>
           </a:p>
@@ -627,35 +627,35 @@
           <a:p>
             <a:pPr lvl="0"/>
             <a:r>
-              <a:rPr lang="de-DE" noProof="0" smtClean="0"/>
+              <a:rPr lang="de-DE" noProof="0"/>
               <a:t>Textmasterformate durch Klicken bearbeiten</a:t>
             </a:r>
           </a:p>
           <a:p>
             <a:pPr lvl="1"/>
             <a:r>
-              <a:rPr lang="de-DE" noProof="0" smtClean="0"/>
+              <a:rPr lang="de-DE" noProof="0"/>
               <a:t>Zweite Ebene</a:t>
             </a:r>
           </a:p>
           <a:p>
             <a:pPr lvl="2"/>
             <a:r>
-              <a:rPr lang="de-DE" noProof="0" smtClean="0"/>
+              <a:rPr lang="de-DE" noProof="0"/>
               <a:t>Dritte Ebene</a:t>
             </a:r>
           </a:p>
           <a:p>
             <a:pPr lvl="3"/>
             <a:r>
-              <a:rPr lang="de-DE" noProof="0" smtClean="0"/>
+              <a:rPr lang="de-DE" noProof="0"/>
               <a:t>Vierte Ebene</a:t>
             </a:r>
           </a:p>
           <a:p>
             <a:pPr lvl="4"/>
             <a:r>
-              <a:rPr lang="de-DE" noProof="0" smtClean="0"/>
+              <a:rPr lang="de-DE" noProof="0"/>
               <a:t>Fünfte Ebene</a:t>
             </a:r>
           </a:p>
@@ -993,7 +993,7 @@
           </a:lstStyle>
           <a:p>
             <a:r>
-              <a:rPr lang="de-DE" smtClean="0"/>
+              <a:rPr lang="de-DE"/>
               <a:t>Titelmasterformat durch Klicken bearbeiten</a:t>
             </a:r>
             <a:endParaRPr lang="de-DE" dirty="0"/>
@@ -1063,7 +1063,7 @@
           <a:p>
             <a:pPr lvl="0"/>
             <a:r>
-              <a:rPr lang="de-DE" smtClean="0"/>
+              <a:rPr lang="de-DE"/>
               <a:t>Textmasterformat bearbeiten</a:t>
             </a:r>
           </a:p>
@@ -1101,7 +1101,7 @@
           </a:lstStyle>
           <a:p>
             <a:r>
-              <a:rPr lang="de-DE" smtClean="0"/>
+              <a:rPr lang="de-DE"/>
               <a:t>Bild durch Klicken auf Symbol hinzufügen</a:t>
             </a:r>
             <a:endParaRPr lang="de-DE" dirty="0"/>
@@ -1118,14 +1118,7 @@
   <p:clrMapOvr>
     <a:masterClrMapping/>
   </p:clrMapOvr>
-  <p:timing>
-    <p:tnLst>
-      <p:par>
-        <p:cTn id="1" dur="indefinite" restart="never" nodeType="tmRoot"/>
-      </p:par>
-    </p:tnLst>
-  </p:timing>
-  <p:extLst mod="1">
+  <p:extLst>
     <p:ext uri="{DCECCB84-F9BA-43D5-87BE-67443E8EF086}">
       <p15:sldGuideLst xmlns:p15="http://schemas.microsoft.com/office/powerpoint/2012/main">
         <p15:guide id="1" orient="horz" pos="731">
@@ -1217,10 +1210,9 @@
           <a:lstStyle/>
           <a:p>
             <a:r>
-              <a:rPr lang="de-DE" dirty="0" smtClean="0"/>
+              <a:rPr lang="de-DE" dirty="0"/>
               <a:t>Titelmasterformat durch Klicken bearbeiten</a:t>
             </a:r>
-            <a:endParaRPr lang="de-DE" dirty="0"/>
           </a:p>
         </p:txBody>
       </p:sp>
@@ -1287,7 +1279,7 @@
           <a:p>
             <a:pPr lvl="0"/>
             <a:r>
-              <a:rPr lang="de-DE" dirty="0" smtClean="0"/>
+              <a:rPr lang="de-DE" dirty="0"/>
               <a:t>Textmasterformat bearbeiten</a:t>
             </a:r>
           </a:p>
@@ -1351,38 +1343,37 @@
           <a:p>
             <a:pPr lvl="0"/>
             <a:r>
-              <a:rPr lang="de-DE" dirty="0" smtClean="0"/>
+              <a:rPr lang="de-DE" dirty="0"/>
               <a:t>Textmasterformat bearbeiten</a:t>
             </a:r>
           </a:p>
           <a:p>
             <a:pPr lvl="1"/>
             <a:r>
-              <a:rPr lang="de-DE" dirty="0" smtClean="0"/>
+              <a:rPr lang="de-DE" dirty="0"/>
               <a:t>Zweite Ebene</a:t>
             </a:r>
           </a:p>
           <a:p>
             <a:pPr lvl="2"/>
             <a:r>
-              <a:rPr lang="de-DE" dirty="0" smtClean="0"/>
+              <a:rPr lang="de-DE" dirty="0"/>
               <a:t>Dritte Ebene</a:t>
             </a:r>
           </a:p>
           <a:p>
             <a:pPr lvl="3"/>
             <a:r>
-              <a:rPr lang="de-DE" dirty="0" smtClean="0"/>
+              <a:rPr lang="de-DE" dirty="0"/>
               <a:t>Vierte Ebene</a:t>
             </a:r>
           </a:p>
           <a:p>
             <a:pPr lvl="4"/>
             <a:r>
-              <a:rPr lang="de-DE" dirty="0" smtClean="0"/>
+              <a:rPr lang="de-DE" dirty="0"/>
               <a:t>Fünfte Ebene</a:t>
             </a:r>
-            <a:endParaRPr lang="de-DE" dirty="0"/>
           </a:p>
         </p:txBody>
       </p:sp>
@@ -1444,38 +1435,37 @@
           <a:p>
             <a:pPr lvl="0"/>
             <a:r>
-              <a:rPr lang="de-DE" dirty="0" smtClean="0"/>
+              <a:rPr lang="de-DE" dirty="0"/>
               <a:t>Textmasterformat bearbeiten</a:t>
             </a:r>
           </a:p>
           <a:p>
             <a:pPr lvl="1"/>
             <a:r>
-              <a:rPr lang="de-DE" dirty="0" smtClean="0"/>
+              <a:rPr lang="de-DE" dirty="0"/>
               <a:t>Zweite Ebene</a:t>
             </a:r>
           </a:p>
           <a:p>
             <a:pPr lvl="2"/>
             <a:r>
-              <a:rPr lang="de-DE" dirty="0" smtClean="0"/>
+              <a:rPr lang="de-DE" dirty="0"/>
               <a:t>Dritte Ebene</a:t>
             </a:r>
           </a:p>
           <a:p>
             <a:pPr lvl="3"/>
             <a:r>
-              <a:rPr lang="de-DE" dirty="0" smtClean="0"/>
+              <a:rPr lang="de-DE" dirty="0"/>
               <a:t>Vierte Ebene</a:t>
             </a:r>
           </a:p>
           <a:p>
             <a:pPr lvl="4"/>
             <a:r>
-              <a:rPr lang="de-DE" dirty="0" smtClean="0"/>
+              <a:rPr lang="de-DE" dirty="0"/>
               <a:t>Fünfte Ebene</a:t>
             </a:r>
-            <a:endParaRPr lang="de-DE" dirty="0"/>
           </a:p>
         </p:txBody>
       </p:sp>
@@ -1537,38 +1527,37 @@
           <a:p>
             <a:pPr lvl="0"/>
             <a:r>
-              <a:rPr lang="de-DE" dirty="0" smtClean="0"/>
+              <a:rPr lang="de-DE" dirty="0"/>
               <a:t>Textmasterformat bearbeiten</a:t>
             </a:r>
           </a:p>
           <a:p>
             <a:pPr lvl="1"/>
             <a:r>
-              <a:rPr lang="de-DE" dirty="0" smtClean="0"/>
+              <a:rPr lang="de-DE" dirty="0"/>
               <a:t>Zweite Ebene</a:t>
             </a:r>
           </a:p>
           <a:p>
             <a:pPr lvl="2"/>
             <a:r>
-              <a:rPr lang="de-DE" dirty="0" smtClean="0"/>
+              <a:rPr lang="de-DE" dirty="0"/>
               <a:t>Dritte Ebene</a:t>
             </a:r>
           </a:p>
           <a:p>
             <a:pPr lvl="3"/>
             <a:r>
-              <a:rPr lang="de-DE" dirty="0" smtClean="0"/>
+              <a:rPr lang="de-DE" dirty="0"/>
               <a:t>Vierte Ebene</a:t>
             </a:r>
           </a:p>
           <a:p>
             <a:pPr lvl="4"/>
             <a:r>
-              <a:rPr lang="de-DE" dirty="0" smtClean="0"/>
+              <a:rPr lang="de-DE" dirty="0"/>
               <a:t>Fünfte Ebene</a:t>
             </a:r>
-            <a:endParaRPr lang="de-DE" dirty="0"/>
           </a:p>
         </p:txBody>
       </p:sp>
@@ -1604,10 +1593,9 @@
           </a:lstStyle>
           <a:p>
             <a:r>
-              <a:rPr lang="de-DE" dirty="0" smtClean="0"/>
+              <a:rPr lang="de-DE" dirty="0"/>
               <a:t>Bild durch Klicken auf Symbol hinzufügen</a:t>
             </a:r>
-            <a:endParaRPr lang="de-DE" dirty="0"/>
           </a:p>
         </p:txBody>
       </p:sp>
@@ -1643,10 +1631,9 @@
           </a:lstStyle>
           <a:p>
             <a:r>
-              <a:rPr lang="de-DE" dirty="0" smtClean="0"/>
+              <a:rPr lang="de-DE" dirty="0"/>
               <a:t>Bild durch Klicken auf Symbol hinzufügen</a:t>
             </a:r>
-            <a:endParaRPr lang="de-DE" dirty="0"/>
           </a:p>
         </p:txBody>
       </p:sp>
@@ -1682,10 +1669,9 @@
           </a:lstStyle>
           <a:p>
             <a:r>
-              <a:rPr lang="de-DE" dirty="0" smtClean="0"/>
+              <a:rPr lang="de-DE" dirty="0"/>
               <a:t>Bild durch Klicken auf Symbol hinzufügen</a:t>
             </a:r>
-            <a:endParaRPr lang="de-DE" dirty="0"/>
           </a:p>
         </p:txBody>
       </p:sp>
@@ -1699,13 +1685,6 @@
   <p:clrMapOvr>
     <a:masterClrMapping/>
   </p:clrMapOvr>
-  <p:timing>
-    <p:tnLst>
-      <p:par>
-        <p:cTn id="1" dur="indefinite" restart="never" nodeType="tmRoot"/>
-      </p:par>
-    </p:tnLst>
-  </p:timing>
   <p:extLst>
     <p:ext uri="{DCECCB84-F9BA-43D5-87BE-67443E8EF086}">
       <p15:sldGuideLst xmlns:p15="http://schemas.microsoft.com/office/powerpoint/2012/main">
@@ -1797,7 +1776,7 @@
           </a:lstStyle>
           <a:p>
             <a:r>
-              <a:rPr lang="de-DE" smtClean="0"/>
+              <a:rPr lang="de-DE"/>
               <a:t>Titelmasterformat durch Klicken bearbeiten</a:t>
             </a:r>
             <a:endParaRPr lang="de-DE" dirty="0"/>
@@ -1867,7 +1846,7 @@
           <a:p>
             <a:pPr lvl="0"/>
             <a:r>
-              <a:rPr lang="de-DE" smtClean="0"/>
+              <a:rPr lang="de-DE"/>
               <a:t>Textmasterformat bearbeiten</a:t>
             </a:r>
           </a:p>
@@ -1905,7 +1884,7 @@
           </a:lstStyle>
           <a:p>
             <a:r>
-              <a:rPr lang="de-DE" smtClean="0"/>
+              <a:rPr lang="de-DE"/>
               <a:t>Bild durch Klicken auf Symbol hinzufügen</a:t>
             </a:r>
             <a:endParaRPr lang="de-DE" dirty="0"/>
@@ -1944,7 +1923,7 @@
           </a:lstStyle>
           <a:p>
             <a:r>
-              <a:rPr lang="de-DE" smtClean="0"/>
+              <a:rPr lang="de-DE"/>
               <a:t>Bild durch Klicken auf Symbol hinzufügen</a:t>
             </a:r>
             <a:endParaRPr lang="de-DE" dirty="0"/>
@@ -1983,7 +1962,7 @@
           </a:lstStyle>
           <a:p>
             <a:r>
-              <a:rPr lang="de-DE" smtClean="0"/>
+              <a:rPr lang="de-DE"/>
               <a:t>Bild durch Klicken auf Symbol hinzufügen</a:t>
             </a:r>
             <a:endParaRPr lang="de-DE" dirty="0"/>
@@ -2049,7 +2028,7 @@
           <a:p>
             <a:pPr lvl="0"/>
             <a:r>
-              <a:rPr lang="de-DE" smtClean="0"/>
+              <a:rPr lang="de-DE"/>
               <a:t>Textmasterformat bearbeiten</a:t>
             </a:r>
           </a:p>
@@ -2089,10 +2068,9 @@
           </a:lstStyle>
           <a:p>
             <a:r>
-              <a:rPr lang="de-DE" dirty="0" smtClean="0"/>
+              <a:rPr lang="de-DE" dirty="0"/>
               <a:t>Logo</a:t>
             </a:r>
-            <a:endParaRPr lang="de-DE" dirty="0"/>
           </a:p>
         </p:txBody>
       </p:sp>
@@ -2106,14 +2084,7 @@
   <p:clrMapOvr>
     <a:masterClrMapping/>
   </p:clrMapOvr>
-  <p:timing>
-    <p:tnLst>
-      <p:par>
-        <p:cTn id="1" dur="indefinite" restart="never" nodeType="tmRoot"/>
-      </p:par>
-    </p:tnLst>
-  </p:timing>
-  <p:extLst mod="1">
+  <p:extLst>
     <p:ext uri="{DCECCB84-F9BA-43D5-87BE-67443E8EF086}">
       <p15:sldGuideLst xmlns:p15="http://schemas.microsoft.com/office/powerpoint/2012/main">
         <p15:guide id="1" orient="horz" pos="731">
@@ -2221,7 +2192,7 @@
           </a:lstStyle>
           <a:p>
             <a:r>
-              <a:rPr lang="de-DE" smtClean="0"/>
+              <a:rPr lang="de-DE"/>
               <a:t>Bild durch Klicken auf Symbol hinzufügen</a:t>
             </a:r>
             <a:endParaRPr lang="de-DE" dirty="0"/>
@@ -2291,7 +2262,7 @@
           <a:p>
             <a:pPr lvl="0"/>
             <a:r>
-              <a:rPr lang="de-DE" smtClean="0"/>
+              <a:rPr lang="de-DE"/>
               <a:t>Textmasterformat bearbeiten</a:t>
             </a:r>
           </a:p>
@@ -2331,10 +2302,9 @@
           </a:lstStyle>
           <a:p>
             <a:r>
-              <a:rPr lang="de-DE" dirty="0" smtClean="0"/>
+              <a:rPr lang="de-DE" dirty="0"/>
               <a:t>Logo</a:t>
             </a:r>
-            <a:endParaRPr lang="de-DE" dirty="0"/>
           </a:p>
         </p:txBody>
       </p:sp>
@@ -2373,7 +2343,7 @@
           </a:lstStyle>
           <a:p>
             <a:r>
-              <a:rPr lang="de-DE" smtClean="0"/>
+              <a:rPr lang="de-DE"/>
               <a:t>Titelmasterformat durch Klicken bearbeiten</a:t>
             </a:r>
             <a:endParaRPr lang="de-DE" dirty="0"/>
@@ -2390,14 +2360,7 @@
   <p:clrMapOvr>
     <a:masterClrMapping/>
   </p:clrMapOvr>
-  <p:timing>
-    <p:tnLst>
-      <p:par>
-        <p:cTn id="1" dur="indefinite" restart="never" nodeType="tmRoot"/>
-      </p:par>
-    </p:tnLst>
-  </p:timing>
-  <p:extLst mod="1">
+  <p:extLst>
     <p:ext uri="{DCECCB84-F9BA-43D5-87BE-67443E8EF086}">
       <p15:sldGuideLst xmlns:p15="http://schemas.microsoft.com/office/powerpoint/2012/main">
         <p15:guide id="1" orient="horz" pos="731">
@@ -2498,7 +2461,7 @@
           </a:lstStyle>
           <a:p>
             <a:r>
-              <a:rPr lang="de-DE" smtClean="0"/>
+              <a:rPr lang="de-DE"/>
               <a:t>Titelmasterformat durch Klicken bearbeiten</a:t>
             </a:r>
             <a:endParaRPr lang="de-DE" dirty="0"/>
@@ -2568,7 +2531,7 @@
           <a:p>
             <a:pPr lvl="0"/>
             <a:r>
-              <a:rPr lang="de-DE" smtClean="0"/>
+              <a:rPr lang="de-DE"/>
               <a:t>Textmasterformat bearbeiten</a:t>
             </a:r>
           </a:p>
@@ -2606,7 +2569,7 @@
           </a:lstStyle>
           <a:p>
             <a:r>
-              <a:rPr lang="de-DE" smtClean="0"/>
+              <a:rPr lang="de-DE"/>
               <a:t>Bild durch Klicken auf Symbol hinzufügen</a:t>
             </a:r>
             <a:endParaRPr lang="de-DE" dirty="0"/>
@@ -2645,7 +2608,7 @@
           </a:lstStyle>
           <a:p>
             <a:r>
-              <a:rPr lang="de-DE" smtClean="0"/>
+              <a:rPr lang="de-DE"/>
               <a:t>Bild durch Klicken auf Symbol hinzufügen</a:t>
             </a:r>
             <a:endParaRPr lang="de-DE" dirty="0"/>
@@ -2684,7 +2647,7 @@
           </a:lstStyle>
           <a:p>
             <a:r>
-              <a:rPr lang="de-DE" smtClean="0"/>
+              <a:rPr lang="de-DE"/>
               <a:t>Bild durch Klicken auf Symbol hinzufügen</a:t>
             </a:r>
             <a:endParaRPr lang="de-DE" dirty="0"/>
@@ -2701,14 +2664,7 @@
   <p:clrMapOvr>
     <a:masterClrMapping/>
   </p:clrMapOvr>
-  <p:timing>
-    <p:tnLst>
-      <p:par>
-        <p:cTn id="1" dur="indefinite" restart="never" nodeType="tmRoot"/>
-      </p:par>
-    </p:tnLst>
-  </p:timing>
-  <p:extLst mod="1">
+  <p:extLst>
     <p:ext uri="{DCECCB84-F9BA-43D5-87BE-67443E8EF086}">
       <p15:sldGuideLst xmlns:p15="http://schemas.microsoft.com/office/powerpoint/2012/main">
         <p15:guide id="1" orient="horz" pos="731">
@@ -2842,38 +2798,37 @@
           <a:p>
             <a:pPr lvl="0"/>
             <a:r>
-              <a:rPr lang="de-DE" dirty="0" smtClean="0"/>
+              <a:rPr lang="de-DE" dirty="0"/>
               <a:t>Textmasterformat bearbeiten</a:t>
             </a:r>
           </a:p>
           <a:p>
             <a:pPr lvl="1"/>
             <a:r>
-              <a:rPr lang="de-DE" dirty="0" smtClean="0"/>
+              <a:rPr lang="de-DE" dirty="0"/>
               <a:t>Zweite Ebene</a:t>
             </a:r>
           </a:p>
           <a:p>
             <a:pPr lvl="2"/>
             <a:r>
-              <a:rPr lang="de-DE" dirty="0" smtClean="0"/>
+              <a:rPr lang="de-DE" dirty="0"/>
               <a:t>Dritte Ebene</a:t>
             </a:r>
           </a:p>
           <a:p>
             <a:pPr lvl="3"/>
             <a:r>
-              <a:rPr lang="de-DE" dirty="0" smtClean="0"/>
+              <a:rPr lang="de-DE" dirty="0"/>
               <a:t>Vierte Ebene</a:t>
             </a:r>
           </a:p>
           <a:p>
             <a:pPr lvl="4"/>
             <a:r>
-              <a:rPr lang="de-DE" dirty="0" smtClean="0"/>
+              <a:rPr lang="de-DE" dirty="0"/>
               <a:t>Fünfte Ebene</a:t>
             </a:r>
-            <a:endParaRPr lang="de-DE" dirty="0"/>
           </a:p>
         </p:txBody>
       </p:sp>
@@ -2903,10 +2858,9 @@
           <a:lstStyle/>
           <a:p>
             <a:r>
-              <a:rPr lang="de-DE" dirty="0" smtClean="0"/>
+              <a:rPr lang="de-DE" dirty="0"/>
               <a:t>Titelmasterformat durch Klicken bearbeiten</a:t>
             </a:r>
-            <a:endParaRPr lang="de-DE" dirty="0"/>
           </a:p>
         </p:txBody>
       </p:sp>
@@ -2973,7 +2927,7 @@
           <a:p>
             <a:pPr lvl="0"/>
             <a:r>
-              <a:rPr lang="de-DE" dirty="0" smtClean="0"/>
+              <a:rPr lang="de-DE" dirty="0"/>
               <a:t>Textmasterformat bearbeiten</a:t>
             </a:r>
           </a:p>
@@ -2989,13 +2943,6 @@
   <p:clrMapOvr>
     <a:masterClrMapping/>
   </p:clrMapOvr>
-  <p:timing>
-    <p:tnLst>
-      <p:par>
-        <p:cTn id="1" dur="indefinite" restart="never" nodeType="tmRoot"/>
-      </p:par>
-    </p:tnLst>
-  </p:timing>
 </p:sldLayout>
 </file>
 
@@ -3074,38 +3021,37 @@
           <a:p>
             <a:pPr lvl="0"/>
             <a:r>
-              <a:rPr lang="de-DE" dirty="0" smtClean="0"/>
+              <a:rPr lang="de-DE" dirty="0"/>
               <a:t>Textmasterformat bearbeiten</a:t>
             </a:r>
           </a:p>
           <a:p>
             <a:pPr lvl="1"/>
             <a:r>
-              <a:rPr lang="de-DE" dirty="0" smtClean="0"/>
+              <a:rPr lang="de-DE" dirty="0"/>
               <a:t>Zweite Ebene</a:t>
             </a:r>
           </a:p>
           <a:p>
             <a:pPr lvl="2"/>
             <a:r>
-              <a:rPr lang="de-DE" dirty="0" smtClean="0"/>
+              <a:rPr lang="de-DE" dirty="0"/>
               <a:t>Dritte Ebene</a:t>
             </a:r>
           </a:p>
           <a:p>
             <a:pPr lvl="3"/>
             <a:r>
-              <a:rPr lang="de-DE" dirty="0" smtClean="0"/>
+              <a:rPr lang="de-DE" dirty="0"/>
               <a:t>Vierte Ebene</a:t>
             </a:r>
           </a:p>
           <a:p>
             <a:pPr lvl="4"/>
             <a:r>
-              <a:rPr lang="de-DE" dirty="0" smtClean="0"/>
+              <a:rPr lang="de-DE" dirty="0"/>
               <a:t>Fünfte Ebene</a:t>
             </a:r>
-            <a:endParaRPr lang="de-DE" dirty="0"/>
           </a:p>
         </p:txBody>
       </p:sp>
@@ -3135,10 +3081,9 @@
           <a:lstStyle/>
           <a:p>
             <a:r>
-              <a:rPr lang="de-DE" dirty="0" smtClean="0"/>
+              <a:rPr lang="de-DE" dirty="0"/>
               <a:t>Titelmasterformat durch Klicken bearbeiten</a:t>
             </a:r>
-            <a:endParaRPr lang="de-DE" dirty="0"/>
           </a:p>
         </p:txBody>
       </p:sp>
@@ -3205,7 +3150,7 @@
           <a:p>
             <a:pPr lvl="0"/>
             <a:r>
-              <a:rPr lang="de-DE" dirty="0" smtClean="0"/>
+              <a:rPr lang="de-DE" dirty="0"/>
               <a:t>Textmasterformat bearbeiten</a:t>
             </a:r>
           </a:p>
@@ -3243,10 +3188,9 @@
           </a:lstStyle>
           <a:p>
             <a:r>
-              <a:rPr lang="de-DE" dirty="0" smtClean="0"/>
+              <a:rPr lang="de-DE" dirty="0"/>
               <a:t>Bild durch Klicken auf Symbol hinzufügen</a:t>
             </a:r>
-            <a:endParaRPr lang="de-DE" dirty="0"/>
           </a:p>
         </p:txBody>
       </p:sp>
@@ -3260,13 +3204,6 @@
   <p:clrMapOvr>
     <a:masterClrMapping/>
   </p:clrMapOvr>
-  <p:timing>
-    <p:tnLst>
-      <p:par>
-        <p:cTn id="1" dur="indefinite" restart="never" nodeType="tmRoot"/>
-      </p:par>
-    </p:tnLst>
-  </p:timing>
   <p:extLst>
     <p:ext uri="{DCECCB84-F9BA-43D5-87BE-67443E8EF086}">
       <p15:sldGuideLst xmlns:p15="http://schemas.microsoft.com/office/powerpoint/2012/main">
@@ -3371,14 +3308,14 @@
           <a:p>
             <a:pPr lvl="0"/>
             <a:r>
-              <a:rPr lang="de-DE" dirty="0" smtClean="0"/>
+              <a:rPr lang="de-DE" dirty="0"/>
               <a:t>Textmasterformat bearbeiten</a:t>
             </a:r>
           </a:p>
           <a:p>
             <a:pPr lvl="1"/>
             <a:r>
-              <a:rPr lang="de-DE" dirty="0" smtClean="0"/>
+              <a:rPr lang="de-DE" dirty="0"/>
               <a:t>Zweite Ebene</a:t>
             </a:r>
           </a:p>
@@ -3410,10 +3347,9 @@
           <a:lstStyle/>
           <a:p>
             <a:r>
-              <a:rPr lang="de-DE" dirty="0" smtClean="0"/>
+              <a:rPr lang="de-DE" dirty="0"/>
               <a:t>Titelmasterformat durch Klicken bearbeiten</a:t>
             </a:r>
-            <a:endParaRPr lang="de-DE" dirty="0"/>
           </a:p>
         </p:txBody>
       </p:sp>
@@ -3480,7 +3416,7 @@
           <a:p>
             <a:pPr lvl="0"/>
             <a:r>
-              <a:rPr lang="de-DE" dirty="0" smtClean="0"/>
+              <a:rPr lang="de-DE" dirty="0"/>
               <a:t>Textmasterformat bearbeiten</a:t>
             </a:r>
           </a:p>
@@ -3518,10 +3454,9 @@
           </a:lstStyle>
           <a:p>
             <a:r>
-              <a:rPr lang="de-DE" dirty="0" smtClean="0"/>
+              <a:rPr lang="de-DE" dirty="0"/>
               <a:t>Bild durch Klicken auf Symbol hinzufügen</a:t>
             </a:r>
-            <a:endParaRPr lang="de-DE" dirty="0"/>
           </a:p>
         </p:txBody>
       </p:sp>
@@ -3583,14 +3518,14 @@
           <a:p>
             <a:pPr lvl="0"/>
             <a:r>
-              <a:rPr lang="de-DE" dirty="0" smtClean="0"/>
+              <a:rPr lang="de-DE" dirty="0"/>
               <a:t>Textmasterformat bearbeiten</a:t>
             </a:r>
           </a:p>
           <a:p>
             <a:pPr lvl="1"/>
             <a:r>
-              <a:rPr lang="de-DE" dirty="0" smtClean="0"/>
+              <a:rPr lang="de-DE" dirty="0"/>
               <a:t>Zweite Ebene</a:t>
             </a:r>
           </a:p>
@@ -3628,10 +3563,9 @@
           </a:lstStyle>
           <a:p>
             <a:r>
-              <a:rPr lang="de-DE" dirty="0" smtClean="0"/>
+              <a:rPr lang="de-DE" dirty="0"/>
               <a:t>Bild durch Klicken auf Symbol hinzufügen</a:t>
             </a:r>
-            <a:endParaRPr lang="de-DE" dirty="0"/>
           </a:p>
         </p:txBody>
       </p:sp>
@@ -3645,13 +3579,6 @@
   <p:clrMapOvr>
     <a:masterClrMapping/>
   </p:clrMapOvr>
-  <p:timing>
-    <p:tnLst>
-      <p:par>
-        <p:cTn id="1" dur="indefinite" restart="never" nodeType="tmRoot"/>
-      </p:par>
-    </p:tnLst>
-  </p:timing>
   <p:extLst>
     <p:ext uri="{DCECCB84-F9BA-43D5-87BE-67443E8EF086}">
       <p15:sldGuideLst xmlns:p15="http://schemas.microsoft.com/office/powerpoint/2012/main">
@@ -3724,10 +3651,9 @@
           <a:lstStyle/>
           <a:p>
             <a:r>
-              <a:rPr lang="de-DE" dirty="0" smtClean="0"/>
+              <a:rPr lang="de-DE" dirty="0"/>
               <a:t>Titelmasterformat durch Klicken bearbeiten</a:t>
             </a:r>
-            <a:endParaRPr lang="de-DE" dirty="0"/>
           </a:p>
         </p:txBody>
       </p:sp>
@@ -3794,7 +3720,7 @@
           <a:p>
             <a:pPr lvl="0"/>
             <a:r>
-              <a:rPr lang="de-DE" dirty="0" smtClean="0"/>
+              <a:rPr lang="de-DE" dirty="0"/>
               <a:t>Textmasterformat bearbeiten</a:t>
             </a:r>
           </a:p>
@@ -3832,10 +3758,9 @@
           </a:lstStyle>
           <a:p>
             <a:r>
-              <a:rPr lang="de-DE" dirty="0" smtClean="0"/>
+              <a:rPr lang="de-DE" dirty="0"/>
               <a:t>Bild durch Klicken auf Symbol hinzufügen</a:t>
             </a:r>
-            <a:endParaRPr lang="de-DE" dirty="0"/>
           </a:p>
         </p:txBody>
       </p:sp>
@@ -3897,38 +3822,37 @@
           <a:p>
             <a:pPr lvl="0"/>
             <a:r>
-              <a:rPr lang="de-DE" dirty="0" smtClean="0"/>
+              <a:rPr lang="de-DE" dirty="0"/>
               <a:t>Textmasterformat bearbeiten</a:t>
             </a:r>
           </a:p>
           <a:p>
             <a:pPr lvl="1"/>
             <a:r>
-              <a:rPr lang="de-DE" dirty="0" smtClean="0"/>
+              <a:rPr lang="de-DE" dirty="0"/>
               <a:t>Zweite Ebene</a:t>
             </a:r>
           </a:p>
           <a:p>
             <a:pPr lvl="2"/>
             <a:r>
-              <a:rPr lang="de-DE" dirty="0" smtClean="0"/>
+              <a:rPr lang="de-DE" dirty="0"/>
               <a:t>Dritte Ebene</a:t>
             </a:r>
           </a:p>
           <a:p>
             <a:pPr lvl="3"/>
             <a:r>
-              <a:rPr lang="de-DE" dirty="0" smtClean="0"/>
+              <a:rPr lang="de-DE" dirty="0"/>
               <a:t>Vierte Ebene</a:t>
             </a:r>
           </a:p>
           <a:p>
             <a:pPr lvl="4"/>
             <a:r>
-              <a:rPr lang="de-DE" dirty="0" smtClean="0"/>
+              <a:rPr lang="de-DE" dirty="0"/>
               <a:t>Fünfte Ebene</a:t>
             </a:r>
-            <a:endParaRPr lang="de-DE" dirty="0"/>
           </a:p>
         </p:txBody>
       </p:sp>
@@ -3942,13 +3866,6 @@
   <p:clrMapOvr>
     <a:masterClrMapping/>
   </p:clrMapOvr>
-  <p:timing>
-    <p:tnLst>
-      <p:par>
-        <p:cTn id="1" dur="indefinite" restart="never" nodeType="tmRoot"/>
-      </p:par>
-    </p:tnLst>
-  </p:timing>
   <p:extLst>
     <p:ext uri="{DCECCB84-F9BA-43D5-87BE-67443E8EF086}">
       <p15:sldGuideLst xmlns:p15="http://schemas.microsoft.com/office/powerpoint/2012/main">
@@ -4053,38 +3970,37 @@
           <a:p>
             <a:pPr lvl="0"/>
             <a:r>
-              <a:rPr lang="de-DE" dirty="0" smtClean="0"/>
+              <a:rPr lang="de-DE" dirty="0"/>
               <a:t>Textmasterformat bearbeiten</a:t>
             </a:r>
           </a:p>
           <a:p>
             <a:pPr lvl="1"/>
             <a:r>
-              <a:rPr lang="de-DE" dirty="0" smtClean="0"/>
+              <a:rPr lang="de-DE" dirty="0"/>
               <a:t>Zweite Ebene</a:t>
             </a:r>
           </a:p>
           <a:p>
             <a:pPr lvl="2"/>
             <a:r>
-              <a:rPr lang="de-DE" dirty="0" smtClean="0"/>
+              <a:rPr lang="de-DE" dirty="0"/>
               <a:t>Dritte Ebene</a:t>
             </a:r>
           </a:p>
           <a:p>
             <a:pPr lvl="3"/>
             <a:r>
-              <a:rPr lang="de-DE" dirty="0" smtClean="0"/>
+              <a:rPr lang="de-DE" dirty="0"/>
               <a:t>Vierte Ebene</a:t>
             </a:r>
           </a:p>
           <a:p>
             <a:pPr lvl="4"/>
             <a:r>
-              <a:rPr lang="de-DE" dirty="0" smtClean="0"/>
+              <a:rPr lang="de-DE" dirty="0"/>
               <a:t>Fünfte Ebene</a:t>
             </a:r>
-            <a:endParaRPr lang="de-DE" dirty="0"/>
           </a:p>
         </p:txBody>
       </p:sp>
@@ -4122,10 +4038,9 @@
           </a:lstStyle>
           <a:p>
             <a:r>
-              <a:rPr lang="de-DE" dirty="0" smtClean="0"/>
+              <a:rPr lang="de-DE" dirty="0"/>
               <a:t>Logo</a:t>
             </a:r>
-            <a:endParaRPr lang="de-DE" dirty="0"/>
           </a:p>
         </p:txBody>
       </p:sp>
@@ -4155,10 +4070,9 @@
           <a:lstStyle/>
           <a:p>
             <a:r>
-              <a:rPr lang="de-DE" dirty="0" smtClean="0"/>
+              <a:rPr lang="de-DE" dirty="0"/>
               <a:t>Titelmasterformat durch Klicken bearbeiten</a:t>
             </a:r>
-            <a:endParaRPr lang="de-DE" dirty="0"/>
           </a:p>
         </p:txBody>
       </p:sp>
@@ -4225,7 +4139,7 @@
           <a:p>
             <a:pPr lvl="0"/>
             <a:r>
-              <a:rPr lang="de-DE" dirty="0" smtClean="0"/>
+              <a:rPr lang="de-DE" dirty="0"/>
               <a:t>Textmasterformat bearbeiten</a:t>
             </a:r>
           </a:p>
@@ -4241,13 +4155,6 @@
   <p:clrMapOvr>
     <a:masterClrMapping/>
   </p:clrMapOvr>
-  <p:timing>
-    <p:tnLst>
-      <p:par>
-        <p:cTn id="1" dur="indefinite" restart="never" nodeType="tmRoot"/>
-      </p:par>
-    </p:tnLst>
-  </p:timing>
 </p:sldLayout>
 </file>
 
@@ -4404,8 +4311,8 @@
         </p:nvSpPr>
         <p:spPr bwMode="auto">
           <a:xfrm>
-            <a:off x="8252460" y="6525345"/>
-            <a:ext cx="3747453" cy="334244"/>
+            <a:off x="7657106" y="6525345"/>
+            <a:ext cx="4342807" cy="334244"/>
           </a:xfrm>
           <a:prstGeom prst="rect">
             <a:avLst/>
@@ -4415,7 +4322,6 @@
             <a:noFill/>
           </a:ln>
           <a:effectLst/>
-          <a:extLst/>
         </p:spPr>
         <p:txBody>
           <a:bodyPr vert="horz" wrap="square" lIns="0" tIns="0" rIns="0" bIns="0" numCol="1" anchor="ctr" anchorCtr="0" compatLnSpc="1">
@@ -4553,16 +4459,12 @@
               <a:defRPr/>
             </a:pPr>
             <a:r>
-              <a:rPr lang="de-DE" sz="1400" dirty="0" smtClean="0">
+              <a:rPr lang="de-DE" sz="1400" dirty="0">
                 <a:latin typeface="Roboto" panose="02000000000000000000" pitchFamily="2" charset="0"/>
                 <a:ea typeface="Roboto" panose="02000000000000000000" pitchFamily="2" charset="0"/>
               </a:rPr>
               <a:t>www.abc.de</a:t>
             </a:r>
-            <a:endParaRPr lang="de-DE" sz="1400" dirty="0">
-              <a:latin typeface="Roboto" panose="02000000000000000000" pitchFamily="2" charset="0"/>
-              <a:ea typeface="Roboto" panose="02000000000000000000" pitchFamily="2" charset="0"/>
-            </a:endParaRPr>
           </a:p>
         </p:txBody>
       </p:sp>
@@ -4587,7 +4489,6 @@
             <a:noFill/>
           </a:ln>
           <a:effectLst/>
-          <a:extLst/>
         </p:spPr>
         <p:txBody>
           <a:bodyPr vert="horz" wrap="square" lIns="0" tIns="0" rIns="0" bIns="0" numCol="1" anchor="ctr" anchorCtr="0" compatLnSpc="1">
@@ -4725,14 +4626,14 @@
               <a:defRPr/>
             </a:pPr>
             <a:r>
-              <a:rPr lang="de-DE" sz="1400" dirty="0" smtClean="0">
+              <a:rPr lang="de-DE" sz="1400" dirty="0">
                 <a:latin typeface="Roboto" panose="02000000000000000000" pitchFamily="2" charset="0"/>
                 <a:ea typeface="Roboto" panose="02000000000000000000" pitchFamily="2" charset="0"/>
               </a:rPr>
               <a:t>Stadt</a:t>
             </a:r>
             <a:r>
-              <a:rPr lang="de-DE" sz="1400" kern="1200" dirty="0" smtClean="0">
+              <a:rPr lang="de-DE" sz="1400" kern="1200" dirty="0">
                 <a:solidFill>
                   <a:schemeClr val="tx1"/>
                 </a:solidFill>
@@ -4740,10 +4641,24 @@
                 <a:ea typeface="Roboto" panose="02000000000000000000" pitchFamily="2" charset="0"/>
                 <a:cs typeface="Arial" charset="0"/>
               </a:rPr>
-              <a:t> </a:t>
-            </a:r>
-            <a:r>
-              <a:rPr lang="de-DE" sz="1400" kern="1200" dirty="0" smtClean="0">
+              <a:t> ∙ TT</a:t>
+            </a:r>
+            <a:r>
+              <a:rPr lang="de-DE" sz="1400" dirty="0">
+                <a:latin typeface="Roboto" panose="02000000000000000000" pitchFamily="2" charset="0"/>
+                <a:ea typeface="Roboto" panose="02000000000000000000" pitchFamily="2" charset="0"/>
+              </a:rPr>
+              <a:t>. Monat</a:t>
+            </a:r>
+            <a:r>
+              <a:rPr lang="de-DE" sz="1400" baseline="0" dirty="0">
+                <a:latin typeface="Roboto" panose="02000000000000000000" pitchFamily="2" charset="0"/>
+                <a:ea typeface="Roboto" panose="02000000000000000000" pitchFamily="2" charset="0"/>
+              </a:rPr>
+              <a:t> Jahr</a:t>
+            </a:r>
+            <a:r>
+              <a:rPr lang="de-DE" sz="1400" kern="1200" dirty="0">
                 <a:solidFill>
                   <a:schemeClr val="tx1"/>
                 </a:solidFill>
@@ -4751,70 +4666,8 @@
                 <a:ea typeface="Roboto" panose="02000000000000000000" pitchFamily="2" charset="0"/>
                 <a:cs typeface="Arial" charset="0"/>
               </a:rPr>
-              <a:t>∙ TT</a:t>
-            </a:r>
-            <a:r>
-              <a:rPr lang="de-DE" sz="1400" dirty="0" smtClean="0">
-                <a:latin typeface="Roboto" panose="02000000000000000000" pitchFamily="2" charset="0"/>
-                <a:ea typeface="Roboto" panose="02000000000000000000" pitchFamily="2" charset="0"/>
-              </a:rPr>
-              <a:t>. Monat</a:t>
-            </a:r>
-            <a:r>
-              <a:rPr lang="de-DE" sz="1400" baseline="0" dirty="0" smtClean="0">
-                <a:latin typeface="Roboto" panose="02000000000000000000" pitchFamily="2" charset="0"/>
-                <a:ea typeface="Roboto" panose="02000000000000000000" pitchFamily="2" charset="0"/>
-              </a:rPr>
-              <a:t> </a:t>
-            </a:r>
-            <a:r>
-              <a:rPr lang="de-DE" sz="1400" baseline="0" dirty="0" smtClean="0">
-                <a:latin typeface="Roboto" panose="02000000000000000000" pitchFamily="2" charset="0"/>
-                <a:ea typeface="Roboto" panose="02000000000000000000" pitchFamily="2" charset="0"/>
-              </a:rPr>
-              <a:t>Jahr</a:t>
-            </a:r>
-            <a:r>
-              <a:rPr lang="de-DE" sz="1400" kern="1200" dirty="0" smtClean="0">
-                <a:solidFill>
-                  <a:schemeClr val="tx1"/>
-                </a:solidFill>
-                <a:latin typeface="Roboto" panose="02000000000000000000" pitchFamily="2" charset="0"/>
-                <a:ea typeface="Roboto" panose="02000000000000000000" pitchFamily="2" charset="0"/>
-                <a:cs typeface="Arial" charset="0"/>
-              </a:rPr>
-              <a:t> </a:t>
-            </a:r>
-            <a:r>
-              <a:rPr lang="de-DE" sz="1400" kern="1200" dirty="0" smtClean="0">
-                <a:solidFill>
-                  <a:schemeClr val="tx1"/>
-                </a:solidFill>
-                <a:latin typeface="Roboto" panose="02000000000000000000" pitchFamily="2" charset="0"/>
-                <a:ea typeface="Roboto" panose="02000000000000000000" pitchFamily="2" charset="0"/>
-                <a:cs typeface="Arial" charset="0"/>
-              </a:rPr>
-              <a:t>∙ </a:t>
-            </a:r>
-            <a:r>
-              <a:rPr lang="de-DE" sz="1400" kern="1200" dirty="0" smtClean="0">
-                <a:solidFill>
-                  <a:schemeClr val="tx1"/>
-                </a:solidFill>
-                <a:latin typeface="Roboto" panose="02000000000000000000" pitchFamily="2" charset="0"/>
-                <a:ea typeface="Roboto" panose="02000000000000000000" pitchFamily="2" charset="0"/>
-                <a:cs typeface="Arial" charset="0"/>
-              </a:rPr>
-              <a:t>Max Mustermann</a:t>
-            </a:r>
-            <a:endParaRPr lang="de-DE" sz="1400" kern="1200" dirty="0">
-              <a:solidFill>
-                <a:schemeClr val="tx1"/>
-              </a:solidFill>
-              <a:latin typeface="Roboto" panose="02000000000000000000" pitchFamily="2" charset="0"/>
-              <a:ea typeface="Roboto" panose="02000000000000000000" pitchFamily="2" charset="0"/>
-              <a:cs typeface="Arial" charset="0"/>
-            </a:endParaRPr>
+              <a:t> ∙ Max Mustermann</a:t>
+            </a:r>
           </a:p>
         </p:txBody>
       </p:sp>
@@ -4857,13 +4710,6 @@
     <p:sldLayoutId id="2147483751" r:id="rId3"/>
     <p:sldLayoutId id="2147483752" r:id="rId4"/>
   </p:sldLayoutIdLst>
-  <p:timing>
-    <p:tnLst>
-      <p:par>
-        <p:cTn id="1" dur="indefinite" restart="never" nodeType="tmRoot"/>
-      </p:par>
-    </p:tnLst>
-  </p:timing>
   <p:hf hdr="0"/>
   <p:txStyles>
     <p:titleStyle>
@@ -5247,7 +5093,7 @@
       </a:lvl9pPr>
     </p:otherStyle>
   </p:txStyles>
-  <p:extLst mod="1">
+  <p:extLst>
     <p:ext uri="{27BBF7A9-308A-43DC-89C8-2F10F3537804}">
       <p15:sldGuideLst xmlns:p15="http://schemas.microsoft.com/office/powerpoint/2012/main">
         <p15:guide id="1" pos="211">
@@ -5412,8 +5258,8 @@
         </p:nvSpPr>
         <p:spPr bwMode="auto">
           <a:xfrm>
-            <a:off x="8252460" y="6525345"/>
-            <a:ext cx="3747453" cy="334244"/>
+            <a:off x="7792278" y="6525345"/>
+            <a:ext cx="4207635" cy="334244"/>
           </a:xfrm>
           <a:prstGeom prst="rect">
             <a:avLst/>
@@ -5423,7 +5269,6 @@
             <a:noFill/>
           </a:ln>
           <a:effectLst/>
-          <a:extLst/>
         </p:spPr>
         <p:txBody>
           <a:bodyPr vert="horz" wrap="square" lIns="0" tIns="0" rIns="0" bIns="0" numCol="1" anchor="ctr" anchorCtr="0" compatLnSpc="1">
@@ -5561,16 +5406,12 @@
               <a:defRPr/>
             </a:pPr>
             <a:r>
-              <a:rPr lang="de-DE" sz="1400" dirty="0" smtClean="0">
+              <a:rPr lang="de-DE" sz="1400" dirty="0">
                 <a:latin typeface="Roboto" panose="02000000000000000000" pitchFamily="2" charset="0"/>
                 <a:ea typeface="Roboto" panose="02000000000000000000" pitchFamily="2" charset="0"/>
               </a:rPr>
               <a:t>www.abc.de</a:t>
             </a:r>
-            <a:endParaRPr lang="de-DE" sz="1400" dirty="0">
-              <a:latin typeface="Roboto" panose="02000000000000000000" pitchFamily="2" charset="0"/>
-              <a:ea typeface="Roboto" panose="02000000000000000000" pitchFamily="2" charset="0"/>
-            </a:endParaRPr>
           </a:p>
         </p:txBody>
       </p:sp>
@@ -5832,7 +5673,6 @@
             <a:noFill/>
           </a:ln>
           <a:effectLst/>
-          <a:extLst/>
         </p:spPr>
         <p:txBody>
           <a:bodyPr vert="horz" wrap="square" lIns="0" tIns="0" rIns="0" bIns="0" numCol="1" anchor="ctr" anchorCtr="0" compatLnSpc="1">
@@ -5970,14 +5810,14 @@
               <a:defRPr/>
             </a:pPr>
             <a:r>
-              <a:rPr lang="de-DE" sz="1400" dirty="0" smtClean="0">
+              <a:rPr lang="de-DE" sz="1400" dirty="0">
                 <a:latin typeface="Roboto" panose="02000000000000000000" pitchFamily="2" charset="0"/>
                 <a:ea typeface="Roboto" panose="02000000000000000000" pitchFamily="2" charset="0"/>
               </a:rPr>
               <a:t>Stadt</a:t>
             </a:r>
             <a:r>
-              <a:rPr lang="de-DE" sz="1400" kern="1200" dirty="0" smtClean="0">
+              <a:rPr lang="de-DE" sz="1400" kern="1200" dirty="0">
                 <a:solidFill>
                   <a:schemeClr val="tx1"/>
                 </a:solidFill>
@@ -5988,21 +5828,21 @@
               <a:t> ∙ TT</a:t>
             </a:r>
             <a:r>
-              <a:rPr lang="de-DE" sz="1400" dirty="0" smtClean="0">
+              <a:rPr lang="de-DE" sz="1400" dirty="0">
                 <a:latin typeface="Roboto" panose="02000000000000000000" pitchFamily="2" charset="0"/>
                 <a:ea typeface="Roboto" panose="02000000000000000000" pitchFamily="2" charset="0"/>
               </a:rPr>
               <a:t>. Monat</a:t>
             </a:r>
             <a:r>
-              <a:rPr lang="de-DE" sz="1400" baseline="0" dirty="0" smtClean="0">
+              <a:rPr lang="de-DE" sz="1400" baseline="0" dirty="0">
                 <a:latin typeface="Roboto" panose="02000000000000000000" pitchFamily="2" charset="0"/>
                 <a:ea typeface="Roboto" panose="02000000000000000000" pitchFamily="2" charset="0"/>
               </a:rPr>
               <a:t> Jahr</a:t>
             </a:r>
             <a:r>
-              <a:rPr lang="de-DE" sz="1400" kern="1200" dirty="0" smtClean="0">
+              <a:rPr lang="de-DE" sz="1400" kern="1200" dirty="0">
                 <a:solidFill>
                   <a:schemeClr val="tx1"/>
                 </a:solidFill>
@@ -6012,14 +5852,6 @@
               </a:rPr>
               <a:t> ∙ Max Mustermann</a:t>
             </a:r>
-            <a:endParaRPr lang="de-DE" sz="1400" kern="1200" dirty="0">
-              <a:solidFill>
-                <a:schemeClr val="tx1"/>
-              </a:solidFill>
-              <a:latin typeface="Roboto" panose="02000000000000000000" pitchFamily="2" charset="0"/>
-              <a:ea typeface="Roboto" panose="02000000000000000000" pitchFamily="2" charset="0"/>
-              <a:cs typeface="Arial" charset="0"/>
-            </a:endParaRPr>
           </a:p>
         </p:txBody>
       </p:sp>
@@ -6039,13 +5871,6 @@
     <p:sldLayoutId id="2147483719" r:id="rId5"/>
     <p:sldLayoutId id="2147483757" r:id="rId6"/>
   </p:sldLayoutIdLst>
-  <p:timing>
-    <p:tnLst>
-      <p:par>
-        <p:cTn id="1" dur="indefinite" restart="never" nodeType="tmRoot"/>
-      </p:par>
-    </p:tnLst>
-  </p:timing>
   <p:txStyles>
     <p:titleStyle>
       <a:lvl1pPr algn="l" defTabSz="914400" rtl="0" eaLnBrk="1" latinLnBrk="0" hangingPunct="1">
@@ -6326,7 +6151,7 @@
       </a:lvl9pPr>
     </p:otherStyle>
   </p:txStyles>
-  <p:extLst mod="1">
+  <p:extLst>
     <p:ext uri="{27BBF7A9-308A-43DC-89C8-2F10F3537804}">
       <p15:sldGuideLst xmlns:p15="http://schemas.microsoft.com/office/powerpoint/2012/main">
         <p15:guide id="1" orient="horz" pos="96" userDrawn="1">

</xml_diff>

<commit_message>
updated paragraph_style.py + example
</commit_message>
<xml_diff>
--- a/pptx_tools/resources/example-template.pptx
+++ b/pptx_tools/resources/example-template.pptx
@@ -258,7 +258,7 @@
           <a:p>
             <a:fld id="{283A9E21-4981-413F-9BAB-A1BE42E0A624}" type="datetimeFigureOut">
               <a:rPr lang="de-DE" smtClean="0"/>
-              <a:t>19.01.2020</a:t>
+              <a:t>17.02.2020</a:t>
             </a:fld>
             <a:endParaRPr lang="de-DE"/>
           </a:p>
@@ -4680,21 +4680,14 @@
           <p:nvPr userDrawn="1"/>
         </p:nvPicPr>
         <p:blipFill>
-          <a:blip r:embed="rId6">
-            <a:extLst>
-              <a:ext uri="{28A0092B-C50C-407E-A947-70E740481C1C}">
-                <a14:useLocalDpi xmlns:a14="http://schemas.microsoft.com/office/drawing/2010/main" val="0"/>
-              </a:ext>
-            </a:extLst>
-          </a:blip>
-          <a:stretch>
-            <a:fillRect/>
-          </a:stretch>
+          <a:blip r:embed="rId6"/>
+          <a:srcRect/>
+          <a:stretch/>
         </p:blipFill>
         <p:spPr>
           <a:xfrm>
-            <a:off x="0" y="379"/>
-            <a:ext cx="2351087" cy="1510543"/>
+            <a:off x="419876" y="-79134"/>
+            <a:ext cx="1510543" cy="1510543"/>
           </a:xfrm>
           <a:prstGeom prst="rect">
             <a:avLst/>
@@ -5227,21 +5220,14 @@
           <p:nvPr userDrawn="1"/>
         </p:nvPicPr>
         <p:blipFill>
-          <a:blip r:embed="rId8">
-            <a:extLst>
-              <a:ext uri="{28A0092B-C50C-407E-A947-70E740481C1C}">
-                <a14:useLocalDpi xmlns:a14="http://schemas.microsoft.com/office/drawing/2010/main" val="0"/>
-              </a:ext>
-            </a:extLst>
-          </a:blip>
-          <a:stretch>
-            <a:fillRect/>
-          </a:stretch>
+          <a:blip r:embed="rId8"/>
+          <a:srcRect/>
+          <a:stretch/>
         </p:blipFill>
         <p:spPr>
           <a:xfrm>
-            <a:off x="0" y="-41374"/>
-            <a:ext cx="1326356" cy="863956"/>
+            <a:off x="239535" y="-49352"/>
+            <a:ext cx="863956" cy="863956"/>
           </a:xfrm>
           <a:prstGeom prst="rect">
             <a:avLst/>

</xml_diff>